<commit_message>
Adds Assignment 7 - finished
</commit_message>
<xml_diff>
--- a/course_material/TCCS-Frontend.pptx
+++ b/course_material/TCCS-Frontend.pptx
@@ -246,7 +246,7 @@
           </a:lstStyle>
           <a:p>
             <a:fld id="{C7DBBFD3-6343-324F-8648-82EA0B3F1D65}" type="datetimeFigureOut">
-              <a:t>11.04.2018</a:t>
+              <a:t>04.06.2018</a:t>
             </a:fld>
             <a:endParaRPr lang="da-DK"/>
           </a:p>
@@ -4323,6 +4323,10 @@
           <a:bodyPr/>
           <a:lstStyle/>
           <a:p>
+            <a:r>
+              <a:rPr lang="en-US" smtClean="0"/>
+              <a:t>Assignments 2 - 4</a:t>
+            </a:r>
             <a:endParaRPr lang="en-US" dirty="0"/>
           </a:p>
         </p:txBody>

</xml_diff>

<commit_message>
Small update in pptx
</commit_message>
<xml_diff>
--- a/course_material/TCCS-Frontend.pptx
+++ b/course_material/TCCS-Frontend.pptx
@@ -696,7 +696,7 @@
           </a:lstStyle>
           <a:p>
             <a:fld id="{C7DBBFD3-6343-324F-8648-82EA0B3F1D65}" type="datetimeFigureOut">
-              <a:t>6/5/2018</a:t>
+              <a:t>10.02.2019</a:t>
             </a:fld>
             <a:endParaRPr lang="da-DK"/>
           </a:p>
@@ -1871,6 +1871,120 @@
     <p:extLst>
       <p:ext uri="{BB962C8B-B14F-4D97-AF65-F5344CB8AC3E}">
         <p14:creationId xmlns:p14="http://schemas.microsoft.com/office/powerpoint/2010/main" val="1748757401"/>
+      </p:ext>
+    </p:extLst>
+  </p:cSld>
+  <p:clrMapOvr>
+    <a:masterClrMapping/>
+  </p:clrMapOvr>
+</p:notes>
+</file>
+
+<file path=ppt/notesSlides/notesSlide3.xml><?xml version="1.0" encoding="utf-8"?>
+<p:notes xmlns:a="http://schemas.openxmlformats.org/drawingml/2006/main" xmlns:r="http://schemas.openxmlformats.org/officeDocument/2006/relationships" xmlns:p="http://schemas.openxmlformats.org/presentationml/2006/main">
+  <p:cSld>
+    <p:spTree>
+      <p:nvGrpSpPr>
+        <p:cNvPr id="1" name=""/>
+        <p:cNvGrpSpPr/>
+        <p:nvPr/>
+      </p:nvGrpSpPr>
+      <p:grpSpPr>
+        <a:xfrm>
+          <a:off x="0" y="0"/>
+          <a:ext cx="0" cy="0"/>
+          <a:chOff x="0" y="0"/>
+          <a:chExt cx="0" cy="0"/>
+        </a:xfrm>
+      </p:grpSpPr>
+      <p:sp>
+        <p:nvSpPr>
+          <p:cNvPr id="2" name="Slide Image Placeholder 1"/>
+          <p:cNvSpPr>
+            <a:spLocks noGrp="1" noRot="1" noChangeAspect="1"/>
+          </p:cNvSpPr>
+          <p:nvPr>
+            <p:ph type="sldImg"/>
+          </p:nvPr>
+        </p:nvSpPr>
+        <p:spPr/>
+      </p:sp>
+      <p:sp>
+        <p:nvSpPr>
+          <p:cNvPr id="3" name="Notes Placeholder 2"/>
+          <p:cNvSpPr>
+            <a:spLocks noGrp="1"/>
+          </p:cNvSpPr>
+          <p:nvPr>
+            <p:ph type="body" idx="1"/>
+          </p:nvPr>
+        </p:nvSpPr>
+        <p:spPr/>
+        <p:txBody>
+          <a:bodyPr/>
+          <a:lstStyle/>
+          <a:p>
+            <a:pPr marL="171450" indent="-171450">
+              <a:buFontTx/>
+              <a:buChar char="-"/>
+            </a:pPr>
+            <a:r>
+              <a:rPr lang="nb-NO" dirty="0"/>
+              <a:t>Tilsvarer </a:t>
+            </a:r>
+            <a:r>
+              <a:rPr lang="nb-NO" dirty="0" err="1"/>
+              <a:t>Browser</a:t>
+            </a:r>
+            <a:r>
+              <a:rPr lang="nb-NO" dirty="0"/>
+              <a:t> </a:t>
+            </a:r>
+            <a:r>
+              <a:rPr lang="nb-NO" dirty="0" err="1"/>
+              <a:t>History</a:t>
+            </a:r>
+            <a:r>
+              <a:rPr lang="nb-NO" dirty="0"/>
+              <a:t> API</a:t>
+            </a:r>
+          </a:p>
+          <a:p>
+            <a:pPr marL="171450" indent="-171450">
+              <a:buFontTx/>
+              <a:buChar char="-"/>
+            </a:pPr>
+            <a:endParaRPr lang="nb-NO" dirty="0"/>
+          </a:p>
+        </p:txBody>
+      </p:sp>
+      <p:sp>
+        <p:nvSpPr>
+          <p:cNvPr id="4" name="Slide Number Placeholder 3"/>
+          <p:cNvSpPr>
+            <a:spLocks noGrp="1"/>
+          </p:cNvSpPr>
+          <p:nvPr>
+            <p:ph type="sldNum" sz="quarter" idx="5"/>
+          </p:nvPr>
+        </p:nvSpPr>
+        <p:spPr/>
+        <p:txBody>
+          <a:bodyPr/>
+          <a:lstStyle/>
+          <a:p>
+            <a:fld id="{EFAC016E-5E5F-3248-8F94-DBEB972C2B51}" type="slidenum">
+              <a:rPr lang="nb-NO" smtClean="0"/>
+              <a:t>11</a:t>
+            </a:fld>
+            <a:endParaRPr lang="nb-NO"/>
+          </a:p>
+        </p:txBody>
+      </p:sp>
+    </p:spTree>
+    <p:extLst>
+      <p:ext uri="{BB962C8B-B14F-4D97-AF65-F5344CB8AC3E}">
+        <p14:creationId xmlns:p14="http://schemas.microsoft.com/office/powerpoint/2010/main" val="2630292947"/>
       </p:ext>
     </p:extLst>
   </p:cSld>
@@ -5072,60 +5186,67 @@
           <a:lstStyle/>
           <a:p>
             <a:r>
-              <a:rPr lang="en-US" err="1"/>
+              <a:rPr lang="en-US" dirty="0"/>
+              <a:t>&lt;router-view/&gt;</a:t>
+            </a:r>
+          </a:p>
+          <a:p>
+            <a:r>
+              <a:rPr lang="en-US" dirty="0" err="1"/>
               <a:t>this.$router</a:t>
             </a:r>
+            <a:endParaRPr lang="en-US" dirty="0"/>
           </a:p>
           <a:p>
             <a:pPr lvl="1"/>
             <a:r>
-              <a:rPr lang="en-US" sz="3200"/>
+              <a:rPr lang="en-US" sz="3200" dirty="0"/>
               <a:t>push</a:t>
             </a:r>
           </a:p>
           <a:p>
             <a:pPr lvl="1"/>
             <a:r>
-              <a:rPr lang="en-US" sz="3200"/>
+              <a:rPr lang="en-US" sz="3200" dirty="0"/>
               <a:t>replace</a:t>
             </a:r>
-            <a:endParaRPr lang="en-US"/>
+            <a:endParaRPr lang="en-US" dirty="0"/>
           </a:p>
           <a:p>
             <a:pPr lvl="1"/>
             <a:r>
-              <a:rPr lang="en-US" sz="3200"/>
+              <a:rPr lang="en-US" sz="3200" dirty="0"/>
               <a:t>go</a:t>
             </a:r>
           </a:p>
           <a:p>
             <a:r>
-              <a:rPr lang="en-US" sz="3600"/>
+              <a:rPr lang="en-US" sz="3600" dirty="0"/>
               <a:t>&lt;router-link&gt;&lt;/router-link&gt;</a:t>
             </a:r>
           </a:p>
           <a:p>
             <a:pPr lvl="1"/>
             <a:r>
-              <a:rPr lang="en-US" sz="3200"/>
+              <a:rPr lang="en-US" sz="3200" dirty="0"/>
               <a:t>to</a:t>
             </a:r>
           </a:p>
           <a:p>
             <a:pPr lvl="1"/>
             <a:r>
-              <a:rPr lang="en-US" sz="3200"/>
+              <a:rPr lang="en-US" sz="3200" dirty="0"/>
               <a:t>replace</a:t>
             </a:r>
           </a:p>
           <a:p>
-            <a:endParaRPr lang="en-US"/>
-          </a:p>
-          <a:p>
-            <a:endParaRPr lang="en-US"/>
-          </a:p>
-          <a:p>
-            <a:endParaRPr lang="en-US"/>
+            <a:endParaRPr lang="en-US" dirty="0"/>
+          </a:p>
+          <a:p>
+            <a:endParaRPr lang="en-US" dirty="0"/>
+          </a:p>
+          <a:p>
+            <a:endParaRPr lang="en-US" dirty="0"/>
           </a:p>
         </p:txBody>
       </p:sp>
@@ -5209,28 +5330,29 @@
           <a:lstStyle/>
           <a:p>
             <a:r>
-              <a:rPr lang="en-US" err="1"/>
+              <a:rPr lang="en-US" dirty="0" err="1"/>
               <a:t>this.$route</a:t>
             </a:r>
+            <a:endParaRPr lang="en-US" dirty="0"/>
           </a:p>
           <a:p>
             <a:pPr lvl="1"/>
             <a:r>
-              <a:rPr lang="en-US" err="1"/>
+              <a:rPr lang="en-US" dirty="0"/>
               <a:t>params</a:t>
             </a:r>
           </a:p>
           <a:p>
             <a:pPr lvl="1"/>
             <a:r>
-              <a:rPr lang="en-US"/>
+              <a:rPr lang="en-US" dirty="0"/>
               <a:t>query</a:t>
             </a:r>
           </a:p>
           <a:p>
             <a:pPr lvl="1"/>
             <a:r>
-              <a:rPr lang="en-US"/>
+              <a:rPr lang="en-US" dirty="0"/>
               <a:t>...</a:t>
             </a:r>
           </a:p>
@@ -5361,24 +5483,24 @@
           <a:lstStyle/>
           <a:p>
             <a:r>
-              <a:rPr lang="en-US"/>
+              <a:rPr lang="en-US" dirty="0"/>
               <a:t>Test Driven Development</a:t>
             </a:r>
           </a:p>
           <a:p>
             <a:r>
-              <a:rPr lang="en-US"/>
+              <a:rPr lang="en-US" dirty="0"/>
               <a:t>Why?</a:t>
             </a:r>
           </a:p>
           <a:p>
             <a:r>
-              <a:rPr lang="en-US"/>
+              <a:rPr lang="en-US" dirty="0"/>
               <a:t>What to test in GUI</a:t>
             </a:r>
           </a:p>
           <a:p>
-            <a:endParaRPr lang="en-US"/>
+            <a:endParaRPr lang="en-US" dirty="0"/>
           </a:p>
         </p:txBody>
       </p:sp>
@@ -6014,7 +6136,7 @@
           <a:lstStyle/>
           <a:p>
             <a:r>
-              <a:rPr lang="en-US"/>
+              <a:rPr lang="en-US" dirty="0"/>
               <a:t>Concept: Component </a:t>
             </a:r>
           </a:p>
@@ -6041,43 +6163,44 @@
           <a:lstStyle/>
           <a:p>
             <a:r>
-              <a:rPr lang="en-US"/>
+              <a:rPr lang="en-US" dirty="0"/>
               <a:t>export something</a:t>
             </a:r>
           </a:p>
           <a:p>
             <a:r>
-              <a:rPr lang="en-US"/>
+              <a:rPr lang="en-US" dirty="0"/>
               <a:t>export default C</a:t>
             </a:r>
           </a:p>
           <a:p>
             <a:r>
-              <a:rPr lang="en-US"/>
+              <a:rPr lang="en-US" dirty="0"/>
               <a:t>import C from './module'</a:t>
             </a:r>
           </a:p>
           <a:p>
             <a:r>
-              <a:rPr lang="en-US"/>
+              <a:rPr lang="en-US" dirty="0"/>
               <a:t>import { something } from './module'   === </a:t>
             </a:r>
             <a:r>
-              <a:rPr lang="en-US" err="1"/>
+              <a:rPr lang="en-US" dirty="0" err="1"/>
               <a:t>C.something</a:t>
             </a:r>
-          </a:p>
-          <a:p>
-            <a:r>
-              <a:rPr lang="en-US"/>
+            <a:endParaRPr lang="en-US" dirty="0"/>
+          </a:p>
+          <a:p>
+            <a:r>
+              <a:rPr lang="en-US" dirty="0"/>
               <a:t>.</a:t>
             </a:r>
             <a:r>
-              <a:rPr lang="en-US" err="1"/>
+              <a:rPr lang="en-US" dirty="0" err="1"/>
               <a:t>vue</a:t>
             </a:r>
             <a:r>
-              <a:rPr lang="en-US"/>
+              <a:rPr lang="en-US" dirty="0"/>
               <a:t> files:</a:t>
             </a:r>
           </a:p>
@@ -6086,7 +6209,7 @@
               <a:buNone/>
             </a:pPr>
             <a:r>
-              <a:rPr lang="en-US"/>
+              <a:rPr lang="en-US" dirty="0"/>
               <a:t>&lt;template&gt;&lt;/template&gt;</a:t>
             </a:r>
           </a:p>
@@ -6095,7 +6218,7 @@
               <a:buNone/>
             </a:pPr>
             <a:r>
-              <a:rPr lang="en-US"/>
+              <a:rPr lang="en-US" dirty="0"/>
               <a:t>&lt;script&gt;&lt;/script&gt;</a:t>
             </a:r>
           </a:p>
@@ -6104,7 +6227,7 @@
               <a:buNone/>
             </a:pPr>
             <a:r>
-              <a:rPr lang="en-US"/>
+              <a:rPr lang="en-US" dirty="0"/>
               <a:t>&lt;style&gt;&lt;/style&gt;</a:t>
             </a:r>
           </a:p>
@@ -6183,33 +6306,33 @@
           <a:lstStyle/>
           <a:p>
             <a:r>
-              <a:rPr lang="en-US"/>
+              <a:rPr lang="en-US" dirty="0"/>
               <a:t>props =&gt; external</a:t>
             </a:r>
           </a:p>
           <a:p>
             <a:r>
-              <a:rPr lang="en-US"/>
+              <a:rPr lang="en-US" dirty="0"/>
               <a:t>data =&gt; internal</a:t>
             </a:r>
           </a:p>
           <a:p>
             <a:r>
-              <a:rPr lang="en-US"/>
+              <a:rPr lang="en-US" dirty="0"/>
               <a:t>computed =&gt; generated (functions)</a:t>
             </a:r>
           </a:p>
           <a:p>
             <a:r>
-              <a:rPr lang="en-US"/>
+              <a:rPr lang="en-US" dirty="0"/>
               <a:t>methods =&gt; methods for events</a:t>
             </a:r>
           </a:p>
           <a:p>
-            <a:endParaRPr lang="en-US"/>
-          </a:p>
-          <a:p>
-            <a:endParaRPr lang="en-US"/>
+            <a:endParaRPr lang="en-US" dirty="0"/>
+          </a:p>
+          <a:p>
+            <a:endParaRPr lang="en-US" dirty="0"/>
           </a:p>
         </p:txBody>
       </p:sp>
@@ -7637,45 +7760,6 @@
 </file>
 
 <file path=customXml/item1.xml><?xml version="1.0" encoding="utf-8"?>
-<p:properties xmlns:p="http://schemas.microsoft.com/office/2006/metadata/properties" xmlns:xsi="http://www.w3.org/2001/XMLSchema-instance" xmlns:pc="http://schemas.microsoft.com/office/infopath/2007/PartnerControls">
-  <documentManagement>
-    <R_x00e6_kkef_x00f8_lge xmlns="9c035199-34fe-41f5-aa4a-b81609954cdd">30</R_x00e6_kkef_x00f8_lge>
-    <Guideline xmlns="9c035199-34fe-41f5-aa4a-b81609954cdd">
-      <Url xsi:nil="true"/>
-      <Description xsi:nil="true"/>
-    </Guideline>
-    <CCMTemplateName xmlns="http://schemas.microsoft.com/sharepoint/v3" xsi:nil="true"/>
-    <CCMTemplateVersion xmlns="http://schemas.microsoft.com/sharepoint/v3" xsi:nil="true"/>
-    <Sprog xmlns="9c035199-34fe-41f5-aa4a-b81609954cdd">DA</Sprog>
-    <CCMTemplateDate xmlns="http://schemas.microsoft.com/sharepoint/v3">2014-07-30T22:00:00+00:00</CCMTemplateDate>
-    <CCMTemplateResponsible xmlns="http://schemas.microsoft.com/sharepoint/v3">
-      <UserInfo>
-        <DisplayName/>
-        <AccountId xsi:nil="true"/>
-        <AccountType/>
-      </UserInfo>
-    </CCMTemplateResponsible>
-    <TemplateType xmlns="9c035199-34fe-41f5-aa4a-b81609954cdd">Generelt</TemplateType>
-    <Deliverable xmlns="http://schemas.microsoft.com/sharepoint/v3" xsi:nil="true"/>
-    <_dlc_DocId xmlns="3062a005-2a53-49b8-87d1-0d9762f3d40a">T2YKUWDCCE4Z-12-78</_dlc_DocId>
-    <_dlc_DocIdUrl xmlns="3062a005-2a53-49b8-87d1-0d9762f3d40a">
-      <Url>https://goto.netcompany.com/GOAdministration/_layouts/15/DocIdRedir.aspx?ID=T2YKUWDCCE4Z-12-78</Url>
-      <Description>T2YKUWDCCE4Z-12-78</Description>
-    </_dlc_DocIdUrl>
-  </documentManagement>
-</p:properties>
-</file>
-
-<file path=customXml/item2.xml><?xml version="1.0" encoding="utf-8"?>
-<?mso-contentType ?>
-<FormTemplates xmlns="http://schemas.microsoft.com/sharepoint/v3/contenttype/forms">
-  <Display>DocumentLibraryForm</Display>
-  <Edit>DocumentLibraryForm</Edit>
-  <New>DocumentLibraryForm</New>
-</FormTemplates>
-</file>
-
-<file path=customXml/item3.xml><?xml version="1.0" encoding="utf-8"?>
 <ct:contentTypeSchema xmlns:ct="http://schemas.microsoft.com/office/2006/metadata/contentType" xmlns:ma="http://schemas.microsoft.com/office/2006/metadata/properties/metaAttributes" ct:_="" ma:_="" ma:contentTypeName="Dokument" ma:contentTypeID="0x010100B43365BADAF0A24D90DB1F3DE146000C" ma:contentTypeVersion="14" ma:contentTypeDescription="Opret et nyt dokument." ma:contentTypeScope="" ma:versionID="b741021eedef7a7115eb72c43f129bee">
   <xsd:schema xmlns:xsd="http://www.w3.org/2001/XMLSchema" xmlns:xs="http://www.w3.org/2001/XMLSchema" xmlns:p="http://schemas.microsoft.com/office/2006/metadata/properties" xmlns:ns1="http://schemas.microsoft.com/sharepoint/v3" xmlns:ns2="3062a005-2a53-49b8-87d1-0d9762f3d40a" xmlns:ns3="9c035199-34fe-41f5-aa4a-b81609954cdd" targetNamespace="http://schemas.microsoft.com/office/2006/metadata/properties" ma:root="true" ma:fieldsID="2c5dfc0e83f06806dd4d1cafe43f1ef1" ns1:_="" ns2:_="" ns3:_="">
     <xsd:import namespace="http://schemas.microsoft.com/sharepoint/v3"/>
@@ -7915,6 +7999,45 @@
 </ct:contentTypeSchema>
 </file>
 
+<file path=customXml/item2.xml><?xml version="1.0" encoding="utf-8"?>
+<?mso-contentType ?>
+<FormTemplates xmlns="http://schemas.microsoft.com/sharepoint/v3/contenttype/forms">
+  <Display>DocumentLibraryForm</Display>
+  <Edit>DocumentLibraryForm</Edit>
+  <New>DocumentLibraryForm</New>
+</FormTemplates>
+</file>
+
+<file path=customXml/item3.xml><?xml version="1.0" encoding="utf-8"?>
+<p:properties xmlns:p="http://schemas.microsoft.com/office/2006/metadata/properties" xmlns:xsi="http://www.w3.org/2001/XMLSchema-instance" xmlns:pc="http://schemas.microsoft.com/office/infopath/2007/PartnerControls">
+  <documentManagement>
+    <R_x00e6_kkef_x00f8_lge xmlns="9c035199-34fe-41f5-aa4a-b81609954cdd">30</R_x00e6_kkef_x00f8_lge>
+    <Guideline xmlns="9c035199-34fe-41f5-aa4a-b81609954cdd">
+      <Url xsi:nil="true"/>
+      <Description xsi:nil="true"/>
+    </Guideline>
+    <CCMTemplateName xmlns="http://schemas.microsoft.com/sharepoint/v3" xsi:nil="true"/>
+    <CCMTemplateVersion xmlns="http://schemas.microsoft.com/sharepoint/v3" xsi:nil="true"/>
+    <Sprog xmlns="9c035199-34fe-41f5-aa4a-b81609954cdd">DA</Sprog>
+    <CCMTemplateDate xmlns="http://schemas.microsoft.com/sharepoint/v3">2014-07-30T22:00:00+00:00</CCMTemplateDate>
+    <CCMTemplateResponsible xmlns="http://schemas.microsoft.com/sharepoint/v3">
+      <UserInfo>
+        <DisplayName/>
+        <AccountId xsi:nil="true"/>
+        <AccountType/>
+      </UserInfo>
+    </CCMTemplateResponsible>
+    <TemplateType xmlns="9c035199-34fe-41f5-aa4a-b81609954cdd">Generelt</TemplateType>
+    <Deliverable xmlns="http://schemas.microsoft.com/sharepoint/v3" xsi:nil="true"/>
+    <_dlc_DocId xmlns="3062a005-2a53-49b8-87d1-0d9762f3d40a">T2YKUWDCCE4Z-12-78</_dlc_DocId>
+    <_dlc_DocIdUrl xmlns="3062a005-2a53-49b8-87d1-0d9762f3d40a">
+      <Url>https://goto.netcompany.com/GOAdministration/_layouts/15/DocIdRedir.aspx?ID=T2YKUWDCCE4Z-12-78</Url>
+      <Description>T2YKUWDCCE4Z-12-78</Description>
+    </_dlc_DocIdUrl>
+  </documentManagement>
+</p:properties>
+</file>
+
 <file path=customXml/item4.xml><?xml version="1.0" encoding="utf-8"?>
 <?mso-contentType ?>
 <spe:Receivers xmlns:spe="http://schemas.microsoft.com/sharepoint/events">
@@ -7966,32 +8089,6 @@
 </file>
 
 <file path=customXml/itemProps1.xml><?xml version="1.0" encoding="utf-8"?>
-<ds:datastoreItem xmlns:ds="http://schemas.openxmlformats.org/officeDocument/2006/customXml" ds:itemID="{09A24B84-AF68-4B06-89ED-A483BC44F19D}">
-  <ds:schemaRefs>
-    <ds:schemaRef ds:uri="3062a005-2a53-49b8-87d1-0d9762f3d40a"/>
-    <ds:schemaRef ds:uri="9c035199-34fe-41f5-aa4a-b81609954cdd"/>
-    <ds:schemaRef ds:uri="http://purl.org/dc/dcmitype/"/>
-    <ds:schemaRef ds:uri="http://purl.org/dc/elements/1.1/"/>
-    <ds:schemaRef ds:uri="http://purl.org/dc/terms/"/>
-    <ds:schemaRef ds:uri="http://schemas.microsoft.com/office/2006/documentManagement/types"/>
-    <ds:schemaRef ds:uri="http://schemas.microsoft.com/office/2006/metadata/properties"/>
-    <ds:schemaRef ds:uri="http://schemas.microsoft.com/office/infopath/2007/PartnerControls"/>
-    <ds:schemaRef ds:uri="http://schemas.microsoft.com/sharepoint/v3"/>
-    <ds:schemaRef ds:uri="http://schemas.openxmlformats.org/package/2006/metadata/core-properties"/>
-    <ds:schemaRef ds:uri="http://www.w3.org/XML/1998/namespace"/>
-  </ds:schemaRefs>
-</ds:datastoreItem>
-</file>
-
-<file path=customXml/itemProps2.xml><?xml version="1.0" encoding="utf-8"?>
-<ds:datastoreItem xmlns:ds="http://schemas.openxmlformats.org/officeDocument/2006/customXml" ds:itemID="{2F079C28-9DF0-4EFB-8188-5610D5EC9E09}">
-  <ds:schemaRefs>
-    <ds:schemaRef ds:uri="http://schemas.microsoft.com/sharepoint/v3/contenttype/forms"/>
-  </ds:schemaRefs>
-</ds:datastoreItem>
-</file>
-
-<file path=customXml/itemProps3.xml><?xml version="1.0" encoding="utf-8"?>
 <ds:datastoreItem xmlns:ds="http://schemas.openxmlformats.org/officeDocument/2006/customXml" ds:itemID="{CE944545-B07D-4744-9E03-4F3AE3179F49}">
   <ds:schemaRefs>
     <ds:schemaRef ds:uri="3062a005-2a53-49b8-87d1-0d9762f3d40a"/>
@@ -8011,6 +8108,32 @@
 </ds:datastoreItem>
 </file>
 
+<file path=customXml/itemProps2.xml><?xml version="1.0" encoding="utf-8"?>
+<ds:datastoreItem xmlns:ds="http://schemas.openxmlformats.org/officeDocument/2006/customXml" ds:itemID="{2F079C28-9DF0-4EFB-8188-5610D5EC9E09}">
+  <ds:schemaRefs>
+    <ds:schemaRef ds:uri="http://schemas.microsoft.com/sharepoint/v3/contenttype/forms"/>
+  </ds:schemaRefs>
+</ds:datastoreItem>
+</file>
+
+<file path=customXml/itemProps3.xml><?xml version="1.0" encoding="utf-8"?>
+<ds:datastoreItem xmlns:ds="http://schemas.openxmlformats.org/officeDocument/2006/customXml" ds:itemID="{09A24B84-AF68-4B06-89ED-A483BC44F19D}">
+  <ds:schemaRefs>
+    <ds:schemaRef ds:uri="3062a005-2a53-49b8-87d1-0d9762f3d40a"/>
+    <ds:schemaRef ds:uri="9c035199-34fe-41f5-aa4a-b81609954cdd"/>
+    <ds:schemaRef ds:uri="http://purl.org/dc/dcmitype/"/>
+    <ds:schemaRef ds:uri="http://purl.org/dc/elements/1.1/"/>
+    <ds:schemaRef ds:uri="http://purl.org/dc/terms/"/>
+    <ds:schemaRef ds:uri="http://schemas.microsoft.com/office/2006/documentManagement/types"/>
+    <ds:schemaRef ds:uri="http://schemas.microsoft.com/office/2006/metadata/properties"/>
+    <ds:schemaRef ds:uri="http://schemas.microsoft.com/office/infopath/2007/PartnerControls"/>
+    <ds:schemaRef ds:uri="http://schemas.microsoft.com/sharepoint/v3"/>
+    <ds:schemaRef ds:uri="http://schemas.openxmlformats.org/package/2006/metadata/core-properties"/>
+    <ds:schemaRef ds:uri="http://www.w3.org/XML/1998/namespace"/>
+  </ds:schemaRefs>
+</ds:datastoreItem>
+</file>
+
 <file path=customXml/itemProps4.xml><?xml version="1.0" encoding="utf-8"?>
 <ds:datastoreItem xmlns:ds="http://schemas.openxmlformats.org/officeDocument/2006/customXml" ds:itemID="{D1E5903D-C562-45A7-965B-C767CC23E665}">
   <ds:schemaRefs>

</xml_diff>

<commit_message>
Adds some notes to ppt
</commit_message>
<xml_diff>
--- a/course_material/TCCS-Frontend.pptx
+++ b/course_material/TCCS-Frontend.pptx
@@ -188,433 +188,6 @@
 </p1510:revInfo>
 </file>
 
-<file path=ppt/changesInfos/changesInfo1.xml><?xml version="1.0" encoding="utf-8"?>
-<pc:chgInfo xmlns:a="http://schemas.openxmlformats.org/drawingml/2006/main" xmlns:r="http://schemas.openxmlformats.org/officeDocument/2006/relationships" xmlns:ac="http://schemas.microsoft.com/office/drawing/2013/main/command" xmlns:pc="http://schemas.microsoft.com/office/powerpoint/2013/main/command">
-  <pc:docChgLst>
-    <pc:chgData name="Mikkel Steine" userId="S::mikkels@netcompany.com::e3a6fa7f-6b43-4e52-b274-68841d710d1d" providerId="AD" clId="Web-{49E9DBAE-4FEF-41EE-8BD6-43D78200E18B}"/>
-    <pc:docChg chg="addSld modSld sldOrd">
-      <pc:chgData name="Mikkel Steine" userId="S::mikkels@netcompany.com::e3a6fa7f-6b43-4e52-b274-68841d710d1d" providerId="AD" clId="Web-{49E9DBAE-4FEF-41EE-8BD6-43D78200E18B}" dt="2018-06-04T21:40:42.708" v="665" actId="20577"/>
-      <pc:docMkLst>
-        <pc:docMk/>
-      </pc:docMkLst>
-      <pc:sldChg chg="modSp">
-        <pc:chgData name="Mikkel Steine" userId="S::mikkels@netcompany.com::e3a6fa7f-6b43-4e52-b274-68841d710d1d" providerId="AD" clId="Web-{49E9DBAE-4FEF-41EE-8BD6-43D78200E18B}" dt="2018-06-04T21:40:42.708" v="664" actId="20577"/>
-        <pc:sldMkLst>
-          <pc:docMk/>
-          <pc:sldMk cId="3657994961" sldId="256"/>
-        </pc:sldMkLst>
-        <pc:spChg chg="mod">
-          <ac:chgData name="Mikkel Steine" userId="S::mikkels@netcompany.com::e3a6fa7f-6b43-4e52-b274-68841d710d1d" providerId="AD" clId="Web-{49E9DBAE-4FEF-41EE-8BD6-43D78200E18B}" dt="2018-06-04T21:40:42.708" v="664" actId="20577"/>
-          <ac:spMkLst>
-            <pc:docMk/>
-            <pc:sldMk cId="3657994961" sldId="256"/>
-            <ac:spMk id="2" creationId="{00000000-0000-0000-0000-000000000000}"/>
-          </ac:spMkLst>
-        </pc:spChg>
-        <pc:spChg chg="mod">
-          <ac:chgData name="Mikkel Steine" userId="S::mikkels@netcompany.com::e3a6fa7f-6b43-4e52-b274-68841d710d1d" providerId="AD" clId="Web-{49E9DBAE-4FEF-41EE-8BD6-43D78200E18B}" dt="2018-06-04T21:40:29.848" v="657" actId="20577"/>
-          <ac:spMkLst>
-            <pc:docMk/>
-            <pc:sldMk cId="3657994961" sldId="256"/>
-            <ac:spMk id="6" creationId="{00000000-0000-0000-0000-000000000000}"/>
-          </ac:spMkLst>
-        </pc:spChg>
-      </pc:sldChg>
-      <pc:sldChg chg="modSp">
-        <pc:chgData name="Mikkel Steine" userId="S::mikkels@netcompany.com::e3a6fa7f-6b43-4e52-b274-68841d710d1d" providerId="AD" clId="Web-{49E9DBAE-4FEF-41EE-8BD6-43D78200E18B}" dt="2018-06-04T21:35:49.435" v="537" actId="20577"/>
-        <pc:sldMkLst>
-          <pc:docMk/>
-          <pc:sldMk cId="779671666" sldId="267"/>
-        </pc:sldMkLst>
-        <pc:spChg chg="mod">
-          <ac:chgData name="Mikkel Steine" userId="S::mikkels@netcompany.com::e3a6fa7f-6b43-4e52-b274-68841d710d1d" providerId="AD" clId="Web-{49E9DBAE-4FEF-41EE-8BD6-43D78200E18B}" dt="2018-06-04T21:35:49.435" v="537" actId="20577"/>
-          <ac:spMkLst>
-            <pc:docMk/>
-            <pc:sldMk cId="779671666" sldId="267"/>
-            <ac:spMk id="3" creationId="{00000000-0000-0000-0000-000000000000}"/>
-          </ac:spMkLst>
-        </pc:spChg>
-        <pc:spChg chg="mod">
-          <ac:chgData name="Mikkel Steine" userId="S::mikkels@netcompany.com::e3a6fa7f-6b43-4e52-b274-68841d710d1d" providerId="AD" clId="Web-{49E9DBAE-4FEF-41EE-8BD6-43D78200E18B}" dt="2018-06-04T21:31:17.691" v="397" actId="20577"/>
-          <ac:spMkLst>
-            <pc:docMk/>
-            <pc:sldMk cId="779671666" sldId="267"/>
-            <ac:spMk id="8" creationId="{00000000-0000-0000-0000-000000000000}"/>
-          </ac:spMkLst>
-        </pc:spChg>
-      </pc:sldChg>
-      <pc:sldChg chg="addSp modSp ord">
-        <pc:chgData name="Mikkel Steine" userId="S::mikkels@netcompany.com::e3a6fa7f-6b43-4e52-b274-68841d710d1d" providerId="AD" clId="Web-{49E9DBAE-4FEF-41EE-8BD6-43D78200E18B}" dt="2018-06-04T21:23:26.398" v="311" actId="1076"/>
-        <pc:sldMkLst>
-          <pc:docMk/>
-          <pc:sldMk cId="857154214" sldId="268"/>
-        </pc:sldMkLst>
-        <pc:spChg chg="mod">
-          <ac:chgData name="Mikkel Steine" userId="S::mikkels@netcompany.com::e3a6fa7f-6b43-4e52-b274-68841d710d1d" providerId="AD" clId="Web-{49E9DBAE-4FEF-41EE-8BD6-43D78200E18B}" dt="2018-06-04T21:22:36.381" v="307" actId="20577"/>
-          <ac:spMkLst>
-            <pc:docMk/>
-            <pc:sldMk cId="857154214" sldId="268"/>
-            <ac:spMk id="4" creationId="{00000000-0000-0000-0000-000000000000}"/>
-          </ac:spMkLst>
-        </pc:spChg>
-        <pc:spChg chg="mod">
-          <ac:chgData name="Mikkel Steine" userId="S::mikkels@netcompany.com::e3a6fa7f-6b43-4e52-b274-68841d710d1d" providerId="AD" clId="Web-{49E9DBAE-4FEF-41EE-8BD6-43D78200E18B}" dt="2018-06-04T21:22:23.881" v="296" actId="20577"/>
-          <ac:spMkLst>
-            <pc:docMk/>
-            <pc:sldMk cId="857154214" sldId="268"/>
-            <ac:spMk id="5" creationId="{00000000-0000-0000-0000-000000000000}"/>
-          </ac:spMkLst>
-        </pc:spChg>
-        <pc:picChg chg="add mod ord modCrop">
-          <ac:chgData name="Mikkel Steine" userId="S::mikkels@netcompany.com::e3a6fa7f-6b43-4e52-b274-68841d710d1d" providerId="AD" clId="Web-{49E9DBAE-4FEF-41EE-8BD6-43D78200E18B}" dt="2018-06-04T21:23:26.398" v="311" actId="1076"/>
-          <ac:picMkLst>
-            <pc:docMk/>
-            <pc:sldMk cId="857154214" sldId="268"/>
-            <ac:picMk id="2" creationId="{98CD9DAE-C2E2-4026-9BBB-03C80EDAAED9}"/>
-          </ac:picMkLst>
-        </pc:picChg>
-      </pc:sldChg>
-      <pc:sldChg chg="modSp add ord replId">
-        <pc:chgData name="Mikkel Steine" userId="S::mikkels@netcompany.com::e3a6fa7f-6b43-4e52-b274-68841d710d1d" providerId="AD" clId="Web-{49E9DBAE-4FEF-41EE-8BD6-43D78200E18B}" dt="2018-06-04T21:07:41.544" v="136" actId="14100"/>
-        <pc:sldMkLst>
-          <pc:docMk/>
-          <pc:sldMk cId="391190896" sldId="269"/>
-        </pc:sldMkLst>
-        <pc:spChg chg="mod">
-          <ac:chgData name="Mikkel Steine" userId="S::mikkels@netcompany.com::e3a6fa7f-6b43-4e52-b274-68841d710d1d" providerId="AD" clId="Web-{49E9DBAE-4FEF-41EE-8BD6-43D78200E18B}" dt="2018-06-04T21:00:45.326" v="7" actId="20577"/>
-          <ac:spMkLst>
-            <pc:docMk/>
-            <pc:sldMk cId="391190896" sldId="269"/>
-            <ac:spMk id="4" creationId="{00000000-0000-0000-0000-000000000000}"/>
-          </ac:spMkLst>
-        </pc:spChg>
-        <pc:spChg chg="mod">
-          <ac:chgData name="Mikkel Steine" userId="S::mikkels@netcompany.com::e3a6fa7f-6b43-4e52-b274-68841d710d1d" providerId="AD" clId="Web-{49E9DBAE-4FEF-41EE-8BD6-43D78200E18B}" dt="2018-06-04T21:07:41.544" v="136" actId="14100"/>
-          <ac:spMkLst>
-            <pc:docMk/>
-            <pc:sldMk cId="391190896" sldId="269"/>
-            <ac:spMk id="5" creationId="{00000000-0000-0000-0000-000000000000}"/>
-          </ac:spMkLst>
-        </pc:spChg>
-      </pc:sldChg>
-      <pc:sldChg chg="modSp add replId">
-        <pc:chgData name="Mikkel Steine" userId="S::mikkels@netcompany.com::e3a6fa7f-6b43-4e52-b274-68841d710d1d" providerId="AD" clId="Web-{49E9DBAE-4FEF-41EE-8BD6-43D78200E18B}" dt="2018-06-04T21:17:13.606" v="272" actId="20577"/>
-        <pc:sldMkLst>
-          <pc:docMk/>
-          <pc:sldMk cId="476488934" sldId="270"/>
-        </pc:sldMkLst>
-        <pc:spChg chg="mod">
-          <ac:chgData name="Mikkel Steine" userId="S::mikkels@netcompany.com::e3a6fa7f-6b43-4e52-b274-68841d710d1d" providerId="AD" clId="Web-{49E9DBAE-4FEF-41EE-8BD6-43D78200E18B}" dt="2018-06-04T21:15:23.884" v="248" actId="20577"/>
-          <ac:spMkLst>
-            <pc:docMk/>
-            <pc:sldMk cId="476488934" sldId="270"/>
-            <ac:spMk id="4" creationId="{00000000-0000-0000-0000-000000000000}"/>
-          </ac:spMkLst>
-        </pc:spChg>
-        <pc:spChg chg="mod">
-          <ac:chgData name="Mikkel Steine" userId="S::mikkels@netcompany.com::e3a6fa7f-6b43-4e52-b274-68841d710d1d" providerId="AD" clId="Web-{49E9DBAE-4FEF-41EE-8BD6-43D78200E18B}" dt="2018-06-04T21:17:13.606" v="272" actId="20577"/>
-          <ac:spMkLst>
-            <pc:docMk/>
-            <pc:sldMk cId="476488934" sldId="270"/>
-            <ac:spMk id="5" creationId="{00000000-0000-0000-0000-000000000000}"/>
-          </ac:spMkLst>
-        </pc:spChg>
-      </pc:sldChg>
-      <pc:sldChg chg="modSp add ord replId">
-        <pc:chgData name="Mikkel Steine" userId="S::mikkels@netcompany.com::e3a6fa7f-6b43-4e52-b274-68841d710d1d" providerId="AD" clId="Web-{49E9DBAE-4FEF-41EE-8BD6-43D78200E18B}" dt="2018-06-04T21:24:06.024" v="318" actId="20577"/>
-        <pc:sldMkLst>
-          <pc:docMk/>
-          <pc:sldMk cId="2059061208" sldId="271"/>
-        </pc:sldMkLst>
-        <pc:spChg chg="mod">
-          <ac:chgData name="Mikkel Steine" userId="S::mikkels@netcompany.com::e3a6fa7f-6b43-4e52-b274-68841d710d1d" providerId="AD" clId="Web-{49E9DBAE-4FEF-41EE-8BD6-43D78200E18B}" dt="2018-06-04T21:24:06.024" v="318" actId="20577"/>
-          <ac:spMkLst>
-            <pc:docMk/>
-            <pc:sldMk cId="2059061208" sldId="271"/>
-            <ac:spMk id="3" creationId="{00000000-0000-0000-0000-000000000000}"/>
-          </ac:spMkLst>
-        </pc:spChg>
-      </pc:sldChg>
-      <pc:sldChg chg="modSp add ord replId">
-        <pc:chgData name="Mikkel Steine" userId="S::mikkels@netcompany.com::e3a6fa7f-6b43-4e52-b274-68841d710d1d" providerId="AD" clId="Web-{49E9DBAE-4FEF-41EE-8BD6-43D78200E18B}" dt="2018-06-04T21:30:52.503" v="389" actId="20577"/>
-        <pc:sldMkLst>
-          <pc:docMk/>
-          <pc:sldMk cId="1289836975" sldId="272"/>
-        </pc:sldMkLst>
-        <pc:spChg chg="mod">
-          <ac:chgData name="Mikkel Steine" userId="S::mikkels@netcompany.com::e3a6fa7f-6b43-4e52-b274-68841d710d1d" providerId="AD" clId="Web-{49E9DBAE-4FEF-41EE-8BD6-43D78200E18B}" dt="2018-06-04T21:27:15.513" v="337" actId="20577"/>
-          <ac:spMkLst>
-            <pc:docMk/>
-            <pc:sldMk cId="1289836975" sldId="272"/>
-            <ac:spMk id="4" creationId="{00000000-0000-0000-0000-000000000000}"/>
-          </ac:spMkLst>
-        </pc:spChg>
-        <pc:spChg chg="mod">
-          <ac:chgData name="Mikkel Steine" userId="S::mikkels@netcompany.com::e3a6fa7f-6b43-4e52-b274-68841d710d1d" providerId="AD" clId="Web-{49E9DBAE-4FEF-41EE-8BD6-43D78200E18B}" dt="2018-06-04T21:30:52.503" v="389" actId="20577"/>
-          <ac:spMkLst>
-            <pc:docMk/>
-            <pc:sldMk cId="1289836975" sldId="272"/>
-            <ac:spMk id="5" creationId="{00000000-0000-0000-0000-000000000000}"/>
-          </ac:spMkLst>
-        </pc:spChg>
-      </pc:sldChg>
-      <pc:sldChg chg="modSp add ord replId">
-        <pc:chgData name="Mikkel Steine" userId="S::mikkels@netcompany.com::e3a6fa7f-6b43-4e52-b274-68841d710d1d" providerId="AD" clId="Web-{49E9DBAE-4FEF-41EE-8BD6-43D78200E18B}" dt="2018-06-04T21:38:05.579" v="606" actId="20577"/>
-        <pc:sldMkLst>
-          <pc:docMk/>
-          <pc:sldMk cId="2363362234" sldId="273"/>
-        </pc:sldMkLst>
-        <pc:spChg chg="mod">
-          <ac:chgData name="Mikkel Steine" userId="S::mikkels@netcompany.com::e3a6fa7f-6b43-4e52-b274-68841d710d1d" providerId="AD" clId="Web-{49E9DBAE-4FEF-41EE-8BD6-43D78200E18B}" dt="2018-06-04T21:38:05.579" v="606" actId="20577"/>
-          <ac:spMkLst>
-            <pc:docMk/>
-            <pc:sldMk cId="2363362234" sldId="273"/>
-            <ac:spMk id="3" creationId="{00000000-0000-0000-0000-000000000000}"/>
-          </ac:spMkLst>
-        </pc:spChg>
-      </pc:sldChg>
-      <pc:sldChg chg="add replId">
-        <pc:chgData name="Mikkel Steine" userId="S::mikkels@netcompany.com::e3a6fa7f-6b43-4e52-b274-68841d710d1d" providerId="AD" clId="Web-{49E9DBAE-4FEF-41EE-8BD6-43D78200E18B}" dt="2018-06-04T21:31:11.285" v="395" actId="20577"/>
-        <pc:sldMkLst>
-          <pc:docMk/>
-          <pc:sldMk cId="224518926" sldId="274"/>
-        </pc:sldMkLst>
-      </pc:sldChg>
-      <pc:sldChg chg="modSp add replId">
-        <pc:chgData name="Mikkel Steine" userId="S::mikkels@netcompany.com::e3a6fa7f-6b43-4e52-b274-68841d710d1d" providerId="AD" clId="Web-{49E9DBAE-4FEF-41EE-8BD6-43D78200E18B}" dt="2018-06-04T21:37:51.891" v="596" actId="20577"/>
-        <pc:sldMkLst>
-          <pc:docMk/>
-          <pc:sldMk cId="2680899846" sldId="275"/>
-        </pc:sldMkLst>
-        <pc:spChg chg="mod">
-          <ac:chgData name="Mikkel Steine" userId="S::mikkels@netcompany.com::e3a6fa7f-6b43-4e52-b274-68841d710d1d" providerId="AD" clId="Web-{49E9DBAE-4FEF-41EE-8BD6-43D78200E18B}" dt="2018-06-04T21:36:37.405" v="547" actId="20577"/>
-          <ac:spMkLst>
-            <pc:docMk/>
-            <pc:sldMk cId="2680899846" sldId="275"/>
-            <ac:spMk id="4" creationId="{00000000-0000-0000-0000-000000000000}"/>
-          </ac:spMkLst>
-        </pc:spChg>
-        <pc:spChg chg="mod">
-          <ac:chgData name="Mikkel Steine" userId="S::mikkels@netcompany.com::e3a6fa7f-6b43-4e52-b274-68841d710d1d" providerId="AD" clId="Web-{49E9DBAE-4FEF-41EE-8BD6-43D78200E18B}" dt="2018-06-04T21:37:51.891" v="596" actId="20577"/>
-          <ac:spMkLst>
-            <pc:docMk/>
-            <pc:sldMk cId="2680899846" sldId="275"/>
-            <ac:spMk id="5" creationId="{00000000-0000-0000-0000-000000000000}"/>
-          </ac:spMkLst>
-        </pc:spChg>
-      </pc:sldChg>
-      <pc:sldChg chg="modSp add ord replId">
-        <pc:chgData name="Mikkel Steine" userId="S::mikkels@netcompany.com::e3a6fa7f-6b43-4e52-b274-68841d710d1d" providerId="AD" clId="Web-{49E9DBAE-4FEF-41EE-8BD6-43D78200E18B}" dt="2018-06-04T21:38:01.110" v="603" actId="20577"/>
-        <pc:sldMkLst>
-          <pc:docMk/>
-          <pc:sldMk cId="132389489" sldId="276"/>
-        </pc:sldMkLst>
-        <pc:spChg chg="mod">
-          <ac:chgData name="Mikkel Steine" userId="S::mikkels@netcompany.com::e3a6fa7f-6b43-4e52-b274-68841d710d1d" providerId="AD" clId="Web-{49E9DBAE-4FEF-41EE-8BD6-43D78200E18B}" dt="2018-06-04T21:38:01.110" v="603" actId="20577"/>
-          <ac:spMkLst>
-            <pc:docMk/>
-            <pc:sldMk cId="132389489" sldId="276"/>
-            <ac:spMk id="3" creationId="{00000000-0000-0000-0000-000000000000}"/>
-          </ac:spMkLst>
-        </pc:spChg>
-      </pc:sldChg>
-      <pc:sldChg chg="modSp add replId">
-        <pc:chgData name="Mikkel Steine" userId="S::mikkels@netcompany.com::e3a6fa7f-6b43-4e52-b274-68841d710d1d" providerId="AD" clId="Web-{49E9DBAE-4FEF-41EE-8BD6-43D78200E18B}" dt="2018-06-04T21:39:37.456" v="646" actId="20577"/>
-        <pc:sldMkLst>
-          <pc:docMk/>
-          <pc:sldMk cId="516405358" sldId="277"/>
-        </pc:sldMkLst>
-        <pc:spChg chg="mod">
-          <ac:chgData name="Mikkel Steine" userId="S::mikkels@netcompany.com::e3a6fa7f-6b43-4e52-b274-68841d710d1d" providerId="AD" clId="Web-{49E9DBAE-4FEF-41EE-8BD6-43D78200E18B}" dt="2018-06-04T21:38:31.611" v="615" actId="20577"/>
-          <ac:spMkLst>
-            <pc:docMk/>
-            <pc:sldMk cId="516405358" sldId="277"/>
-            <ac:spMk id="4" creationId="{00000000-0000-0000-0000-000000000000}"/>
-          </ac:spMkLst>
-        </pc:spChg>
-        <pc:spChg chg="mod">
-          <ac:chgData name="Mikkel Steine" userId="S::mikkels@netcompany.com::e3a6fa7f-6b43-4e52-b274-68841d710d1d" providerId="AD" clId="Web-{49E9DBAE-4FEF-41EE-8BD6-43D78200E18B}" dt="2018-06-04T21:39:37.456" v="646" actId="20577"/>
-          <ac:spMkLst>
-            <pc:docMk/>
-            <pc:sldMk cId="516405358" sldId="277"/>
-            <ac:spMk id="5" creationId="{00000000-0000-0000-0000-000000000000}"/>
-          </ac:spMkLst>
-        </pc:spChg>
-      </pc:sldChg>
-      <pc:sldChg chg="modSp add replId">
-        <pc:chgData name="Mikkel Steine" userId="S::mikkels@netcompany.com::e3a6fa7f-6b43-4e52-b274-68841d710d1d" providerId="AD" clId="Web-{49E9DBAE-4FEF-41EE-8BD6-43D78200E18B}" dt="2018-06-04T21:39:43.769" v="648" actId="20577"/>
-        <pc:sldMkLst>
-          <pc:docMk/>
-          <pc:sldMk cId="2873545856" sldId="278"/>
-        </pc:sldMkLst>
-        <pc:spChg chg="mod">
-          <ac:chgData name="Mikkel Steine" userId="S::mikkels@netcompany.com::e3a6fa7f-6b43-4e52-b274-68841d710d1d" providerId="AD" clId="Web-{49E9DBAE-4FEF-41EE-8BD6-43D78200E18B}" dt="2018-06-04T21:39:43.769" v="648" actId="20577"/>
-          <ac:spMkLst>
-            <pc:docMk/>
-            <pc:sldMk cId="2873545856" sldId="278"/>
-            <ac:spMk id="3" creationId="{00000000-0000-0000-0000-000000000000}"/>
-          </ac:spMkLst>
-        </pc:spChg>
-      </pc:sldChg>
-      <pc:sldChg chg="add replId">
-        <pc:chgData name="Mikkel Steine" userId="S::mikkels@netcompany.com::e3a6fa7f-6b43-4e52-b274-68841d710d1d" providerId="AD" clId="Web-{49E9DBAE-4FEF-41EE-8BD6-43D78200E18B}" dt="2018-06-04T21:39:53.738" v="651" actId="20577"/>
-        <pc:sldMkLst>
-          <pc:docMk/>
-          <pc:sldMk cId="3634765285" sldId="279"/>
-        </pc:sldMkLst>
-      </pc:sldChg>
-    </pc:docChg>
-  </pc:docChgLst>
-  <pc:docChgLst>
-    <pc:chgData name="Fredrick Biering" userId="S::fredrickb@netcompany.com::18ac142e-7d44-450e-bab3-e9c59ebfbf95" providerId="AD" clId="Web-{CB932D6E-56D1-46C2-A157-7A807C2C9548}"/>
-    <pc:docChg chg="addSld delSld modSld sldOrd">
-      <pc:chgData name="Fredrick Biering" userId="S::fredrickb@netcompany.com::18ac142e-7d44-450e-bab3-e9c59ebfbf95" providerId="AD" clId="Web-{CB932D6E-56D1-46C2-A157-7A807C2C9548}" dt="2018-06-05T09:25:06.279" v="117"/>
-      <pc:docMkLst>
-        <pc:docMk/>
-      </pc:docMkLst>
-      <pc:sldChg chg="modSp">
-        <pc:chgData name="Fredrick Biering" userId="S::fredrickb@netcompany.com::18ac142e-7d44-450e-bab3-e9c59ebfbf95" providerId="AD" clId="Web-{CB932D6E-56D1-46C2-A157-7A807C2C9548}" dt="2018-06-05T08:50:55.842" v="84" actId="20577"/>
-        <pc:sldMkLst>
-          <pc:docMk/>
-          <pc:sldMk cId="1289836975" sldId="272"/>
-        </pc:sldMkLst>
-        <pc:spChg chg="mod">
-          <ac:chgData name="Fredrick Biering" userId="S::fredrickb@netcompany.com::18ac142e-7d44-450e-bab3-e9c59ebfbf95" providerId="AD" clId="Web-{CB932D6E-56D1-46C2-A157-7A807C2C9548}" dt="2018-06-05T08:50:55.842" v="84" actId="20577"/>
-          <ac:spMkLst>
-            <pc:docMk/>
-            <pc:sldMk cId="1289836975" sldId="272"/>
-            <ac:spMk id="5" creationId="{00000000-0000-0000-0000-000000000000}"/>
-          </ac:spMkLst>
-        </pc:spChg>
-      </pc:sldChg>
-      <pc:sldChg chg="modSp">
-        <pc:chgData name="Fredrick Biering" userId="S::fredrickb@netcompany.com::18ac142e-7d44-450e-bab3-e9c59ebfbf95" providerId="AD" clId="Web-{CB932D6E-56D1-46C2-A157-7A807C2C9548}" dt="2018-06-05T08:07:46.272" v="4" actId="20577"/>
-        <pc:sldMkLst>
-          <pc:docMk/>
-          <pc:sldMk cId="516405358" sldId="277"/>
-        </pc:sldMkLst>
-        <pc:spChg chg="mod">
-          <ac:chgData name="Fredrick Biering" userId="S::fredrickb@netcompany.com::18ac142e-7d44-450e-bab3-e9c59ebfbf95" providerId="AD" clId="Web-{CB932D6E-56D1-46C2-A157-7A807C2C9548}" dt="2018-06-05T08:07:46.272" v="4" actId="20577"/>
-          <ac:spMkLst>
-            <pc:docMk/>
-            <pc:sldMk cId="516405358" sldId="277"/>
-            <ac:spMk id="5" creationId="{00000000-0000-0000-0000-000000000000}"/>
-          </ac:spMkLst>
-        </pc:spChg>
-      </pc:sldChg>
-      <pc:sldChg chg="addSp delSp modSp new ord">
-        <pc:chgData name="Fredrick Biering" userId="S::fredrickb@netcompany.com::18ac142e-7d44-450e-bab3-e9c59ebfbf95" providerId="AD" clId="Web-{CB932D6E-56D1-46C2-A157-7A807C2C9548}" dt="2018-06-05T08:30:27.545" v="70" actId="14100"/>
-        <pc:sldMkLst>
-          <pc:docMk/>
-          <pc:sldMk cId="1892805665" sldId="280"/>
-        </pc:sldMkLst>
-        <pc:spChg chg="mod">
-          <ac:chgData name="Fredrick Biering" userId="S::fredrickb@netcompany.com::18ac142e-7d44-450e-bab3-e9c59ebfbf95" providerId="AD" clId="Web-{CB932D6E-56D1-46C2-A157-7A807C2C9548}" dt="2018-06-05T08:30:02.356" v="60" actId="20577"/>
-          <ac:spMkLst>
-            <pc:docMk/>
-            <pc:sldMk cId="1892805665" sldId="280"/>
-            <ac:spMk id="2" creationId="{0385963C-19C0-4807-AF91-8F32E7E4D014}"/>
-          </ac:spMkLst>
-        </pc:spChg>
-        <pc:spChg chg="mod">
-          <ac:chgData name="Fredrick Biering" userId="S::fredrickb@netcompany.com::18ac142e-7d44-450e-bab3-e9c59ebfbf95" providerId="AD" clId="Web-{CB932D6E-56D1-46C2-A157-7A807C2C9548}" dt="2018-06-05T08:30:21.076" v="68" actId="20577"/>
-          <ac:spMkLst>
-            <pc:docMk/>
-            <pc:sldMk cId="1892805665" sldId="280"/>
-            <ac:spMk id="3" creationId="{DDB1B732-D530-4F66-9120-5FE05F13CFFB}"/>
-          </ac:spMkLst>
-        </pc:spChg>
-        <pc:picChg chg="add del mod">
-          <ac:chgData name="Fredrick Biering" userId="S::fredrickb@netcompany.com::18ac142e-7d44-450e-bab3-e9c59ebfbf95" providerId="AD" clId="Web-{CB932D6E-56D1-46C2-A157-7A807C2C9548}" dt="2018-06-05T08:25:05.279" v="22" actId="14100"/>
-          <ac:picMkLst>
-            <pc:docMk/>
-            <pc:sldMk cId="1892805665" sldId="280"/>
-            <ac:picMk id="4" creationId="{677B3854-FFAB-4183-A21B-F7F31234660D}"/>
-          </ac:picMkLst>
-        </pc:picChg>
-        <pc:picChg chg="add mod">
-          <ac:chgData name="Fredrick Biering" userId="S::fredrickb@netcompany.com::18ac142e-7d44-450e-bab3-e9c59ebfbf95" providerId="AD" clId="Web-{CB932D6E-56D1-46C2-A157-7A807C2C9548}" dt="2018-06-05T08:30:27.545" v="70" actId="14100"/>
-          <ac:picMkLst>
-            <pc:docMk/>
-            <pc:sldMk cId="1892805665" sldId="280"/>
-            <ac:picMk id="6" creationId="{88DB142A-0725-4B32-B2CC-0D1FA70A8690}"/>
-          </ac:picMkLst>
-        </pc:picChg>
-      </pc:sldChg>
-      <pc:sldChg chg="addSp modSp new ord">
-        <pc:chgData name="Fredrick Biering" userId="S::fredrickb@netcompany.com::18ac142e-7d44-450e-bab3-e9c59ebfbf95" providerId="AD" clId="Web-{CB932D6E-56D1-46C2-A157-7A807C2C9548}" dt="2018-06-05T08:30:48.499" v="72" actId="14100"/>
-        <pc:sldMkLst>
-          <pc:docMk/>
-          <pc:sldMk cId="1233184607" sldId="281"/>
-        </pc:sldMkLst>
-        <pc:spChg chg="mod">
-          <ac:chgData name="Fredrick Biering" userId="S::fredrickb@netcompany.com::18ac142e-7d44-450e-bab3-e9c59ebfbf95" providerId="AD" clId="Web-{CB932D6E-56D1-46C2-A157-7A807C2C9548}" dt="2018-06-05T08:30:12.294" v="65" actId="20577"/>
-          <ac:spMkLst>
-            <pc:docMk/>
-            <pc:sldMk cId="1233184607" sldId="281"/>
-            <ac:spMk id="2" creationId="{CDCEC67E-57C3-4F1E-A6A5-E892C0BD9427}"/>
-          </ac:spMkLst>
-        </pc:spChg>
-        <pc:spChg chg="mod">
-          <ac:chgData name="Fredrick Biering" userId="S::fredrickb@netcompany.com::18ac142e-7d44-450e-bab3-e9c59ebfbf95" providerId="AD" clId="Web-{CB932D6E-56D1-46C2-A157-7A807C2C9548}" dt="2018-06-05T08:29:35.058" v="50" actId="20577"/>
-          <ac:spMkLst>
-            <pc:docMk/>
-            <pc:sldMk cId="1233184607" sldId="281"/>
-            <ac:spMk id="3" creationId="{BF13524A-CB33-4460-BD7C-4B1509E7B1C3}"/>
-          </ac:spMkLst>
-        </pc:spChg>
-        <pc:picChg chg="add mod">
-          <ac:chgData name="Fredrick Biering" userId="S::fredrickb@netcompany.com::18ac142e-7d44-450e-bab3-e9c59ebfbf95" providerId="AD" clId="Web-{CB932D6E-56D1-46C2-A157-7A807C2C9548}" dt="2018-06-05T08:30:48.499" v="72" actId="14100"/>
-          <ac:picMkLst>
-            <pc:docMk/>
-            <pc:sldMk cId="1233184607" sldId="281"/>
-            <ac:picMk id="4" creationId="{87B18EE3-4E4A-4E76-A626-533A2D86C108}"/>
-          </ac:picMkLst>
-        </pc:picChg>
-      </pc:sldChg>
-      <pc:sldChg chg="modSp new ord">
-        <pc:chgData name="Fredrick Biering" userId="S::fredrickb@netcompany.com::18ac142e-7d44-450e-bab3-e9c59ebfbf95" providerId="AD" clId="Web-{CB932D6E-56D1-46C2-A157-7A807C2C9548}" dt="2018-06-05T09:25:06.279" v="117"/>
-        <pc:sldMkLst>
-          <pc:docMk/>
-          <pc:sldMk cId="1688171124" sldId="282"/>
-        </pc:sldMkLst>
-        <pc:spChg chg="mod">
-          <ac:chgData name="Fredrick Biering" userId="S::fredrickb@netcompany.com::18ac142e-7d44-450e-bab3-e9c59ebfbf95" providerId="AD" clId="Web-{CB932D6E-56D1-46C2-A157-7A807C2C9548}" dt="2018-06-05T08:52:44.629" v="92" actId="20577"/>
-          <ac:spMkLst>
-            <pc:docMk/>
-            <pc:sldMk cId="1688171124" sldId="282"/>
-            <ac:spMk id="2" creationId="{765494E7-3FE9-498F-B9EC-0ACD8C5EE489}"/>
-          </ac:spMkLst>
-        </pc:spChg>
-        <pc:spChg chg="mod">
-          <ac:chgData name="Fredrick Biering" userId="S::fredrickb@netcompany.com::18ac142e-7d44-450e-bab3-e9c59ebfbf95" providerId="AD" clId="Web-{CB932D6E-56D1-46C2-A157-7A807C2C9548}" dt="2018-06-05T08:59:20.431" v="115" actId="20577"/>
-          <ac:spMkLst>
-            <pc:docMk/>
-            <pc:sldMk cId="1688171124" sldId="282"/>
-            <ac:spMk id="3" creationId="{ACC9B6C6-8614-43EA-B5C0-A4402A1EA750}"/>
-          </ac:spMkLst>
-        </pc:spChg>
-      </pc:sldChg>
-      <pc:sldChg chg="modSp new del">
-        <pc:chgData name="Fredrick Biering" userId="S::fredrickb@netcompany.com::18ac142e-7d44-450e-bab3-e9c59ebfbf95" providerId="AD" clId="Web-{CB932D6E-56D1-46C2-A157-7A807C2C9548}" dt="2018-06-05T08:50:22.466" v="83" actId="20577"/>
-        <pc:sldMkLst>
-          <pc:docMk/>
-          <pc:sldMk cId="3565507738" sldId="282"/>
-        </pc:sldMkLst>
-        <pc:spChg chg="mod">
-          <ac:chgData name="Fredrick Biering" userId="S::fredrickb@netcompany.com::18ac142e-7d44-450e-bab3-e9c59ebfbf95" providerId="AD" clId="Web-{CB932D6E-56D1-46C2-A157-7A807C2C9548}" dt="2018-06-05T08:50:07.481" v="82" actId="20577"/>
-          <ac:spMkLst>
-            <pc:docMk/>
-            <pc:sldMk cId="3565507738" sldId="282"/>
-            <ac:spMk id="2" creationId="{C6D5308C-8300-4640-97C1-81D3803CC9CC}"/>
-          </ac:spMkLst>
-        </pc:spChg>
-      </pc:sldChg>
-    </pc:docChg>
-  </pc:docChgLst>
-</pc:chgInfo>
-</file>
-
 <file path=ppt/notesMasters/notesMaster1.xml><?xml version="1.0" encoding="utf-8"?>
 <p:notesMaster xmlns:a="http://schemas.openxmlformats.org/drawingml/2006/main" xmlns:r="http://schemas.openxmlformats.org/officeDocument/2006/relationships" xmlns:p="http://schemas.openxmlformats.org/presentationml/2006/main">
   <p:cSld>
@@ -696,7 +269,7 @@
           </a:lstStyle>
           <a:p>
             <a:fld id="{C7DBBFD3-6343-324F-8648-82EA0B3F1D65}" type="datetimeFigureOut">
-              <a:t>10.02.2019</a:t>
+              <a:t>03.06.2019</a:t>
             </a:fld>
             <a:endParaRPr lang="da-DK"/>
           </a:p>
@@ -1930,6 +1503,265 @@
             </a:pPr>
             <a:r>
               <a:rPr lang="nb-NO" dirty="0"/>
+              <a:t>props: </a:t>
+            </a:r>
+            <a:r>
+              <a:rPr lang="nb-NO" dirty="0" err="1"/>
+              <a:t>interfacet</a:t>
+            </a:r>
+            <a:r>
+              <a:rPr lang="nb-NO" dirty="0"/>
+              <a:t> til komponenter</a:t>
+            </a:r>
+          </a:p>
+          <a:p>
+            <a:pPr marL="171450" indent="-171450">
+              <a:buFontTx/>
+              <a:buChar char="-"/>
+            </a:pPr>
+            <a:r>
+              <a:rPr lang="nb-NO" dirty="0"/>
+              <a:t>Data: lokal </a:t>
+            </a:r>
+            <a:r>
+              <a:rPr lang="nb-NO" dirty="0" err="1"/>
+              <a:t>state</a:t>
+            </a:r>
+            <a:r>
+              <a:rPr lang="nb-NO" dirty="0"/>
+              <a:t> for komponenter. Kun komponenten selv kan/skal endre denne</a:t>
+            </a:r>
+          </a:p>
+          <a:p>
+            <a:pPr marL="171450" indent="-171450">
+              <a:buFontTx/>
+              <a:buChar char="-"/>
+            </a:pPr>
+            <a:r>
+              <a:rPr lang="nb-NO" dirty="0" err="1"/>
+              <a:t>Computed</a:t>
+            </a:r>
+            <a:r>
+              <a:rPr lang="nb-NO" dirty="0"/>
+              <a:t>: Kan aksesseres fra visningslaget på samme måte som data, men outputen er generert fra annen data </a:t>
+            </a:r>
+          </a:p>
+          <a:p>
+            <a:pPr marL="171450" indent="-171450">
+              <a:buFontTx/>
+              <a:buChar char="-"/>
+            </a:pPr>
+            <a:r>
+              <a:rPr lang="nb-NO" dirty="0"/>
+              <a:t>Methods: Brukes stort sett for å håndtere </a:t>
+            </a:r>
+            <a:r>
+              <a:rPr lang="nb-NO" dirty="0" err="1"/>
+              <a:t>events</a:t>
+            </a:r>
+            <a:r>
+              <a:rPr lang="nb-NO" dirty="0"/>
+              <a:t> som f.eks. tastetrykk. Her </a:t>
+            </a:r>
+            <a:r>
+              <a:rPr lang="nb-NO" dirty="0" err="1"/>
+              <a:t>dispatches</a:t>
+            </a:r>
+            <a:r>
+              <a:rPr lang="nb-NO" dirty="0"/>
+              <a:t> typisk </a:t>
+            </a:r>
+            <a:r>
+              <a:rPr lang="nb-NO" dirty="0" err="1"/>
+              <a:t>actions</a:t>
+            </a:r>
+            <a:endParaRPr lang="nb-NO" dirty="0"/>
+          </a:p>
+          <a:p>
+            <a:endParaRPr lang="nb-NO" dirty="0"/>
+          </a:p>
+        </p:txBody>
+      </p:sp>
+      <p:sp>
+        <p:nvSpPr>
+          <p:cNvPr id="4" name="Slide Number Placeholder 3"/>
+          <p:cNvSpPr>
+            <a:spLocks noGrp="1"/>
+          </p:cNvSpPr>
+          <p:nvPr>
+            <p:ph type="sldNum" sz="quarter" idx="5"/>
+          </p:nvPr>
+        </p:nvSpPr>
+        <p:spPr/>
+        <p:txBody>
+          <a:bodyPr/>
+          <a:lstStyle/>
+          <a:p>
+            <a:fld id="{EFAC016E-5E5F-3248-8F94-DBEB972C2B51}" type="slidenum">
+              <a:rPr lang="nb-NO" smtClean="0"/>
+              <a:t>5</a:t>
+            </a:fld>
+            <a:endParaRPr lang="nb-NO"/>
+          </a:p>
+        </p:txBody>
+      </p:sp>
+    </p:spTree>
+    <p:extLst>
+      <p:ext uri="{BB962C8B-B14F-4D97-AF65-F5344CB8AC3E}">
+        <p14:creationId xmlns:p14="http://schemas.microsoft.com/office/powerpoint/2010/main" val="3355304406"/>
+      </p:ext>
+    </p:extLst>
+  </p:cSld>
+  <p:clrMapOvr>
+    <a:masterClrMapping/>
+  </p:clrMapOvr>
+</p:notes>
+</file>
+
+<file path=ppt/notesSlides/notesSlide4.xml><?xml version="1.0" encoding="utf-8"?>
+<p:notes xmlns:a="http://schemas.openxmlformats.org/drawingml/2006/main" xmlns:r="http://schemas.openxmlformats.org/officeDocument/2006/relationships" xmlns:p="http://schemas.openxmlformats.org/presentationml/2006/main">
+  <p:cSld>
+    <p:spTree>
+      <p:nvGrpSpPr>
+        <p:cNvPr id="1" name=""/>
+        <p:cNvGrpSpPr/>
+        <p:nvPr/>
+      </p:nvGrpSpPr>
+      <p:grpSpPr>
+        <a:xfrm>
+          <a:off x="0" y="0"/>
+          <a:ext cx="0" cy="0"/>
+          <a:chOff x="0" y="0"/>
+          <a:chExt cx="0" cy="0"/>
+        </a:xfrm>
+      </p:grpSpPr>
+      <p:sp>
+        <p:nvSpPr>
+          <p:cNvPr id="2" name="Slide Image Placeholder 1"/>
+          <p:cNvSpPr>
+            <a:spLocks noGrp="1" noRot="1" noChangeAspect="1"/>
+          </p:cNvSpPr>
+          <p:nvPr>
+            <p:ph type="sldImg"/>
+          </p:nvPr>
+        </p:nvSpPr>
+        <p:spPr/>
+      </p:sp>
+      <p:sp>
+        <p:nvSpPr>
+          <p:cNvPr id="3" name="Notes Placeholder 2"/>
+          <p:cNvSpPr>
+            <a:spLocks noGrp="1"/>
+          </p:cNvSpPr>
+          <p:nvPr>
+            <p:ph type="body" idx="1"/>
+          </p:nvPr>
+        </p:nvSpPr>
+        <p:spPr/>
+        <p:txBody>
+          <a:bodyPr/>
+          <a:lstStyle/>
+          <a:p>
+            <a:r>
+              <a:rPr lang="nb-NO" dirty="0"/>
+              <a:t>- Video: </a:t>
+            </a:r>
+            <a:r>
+              <a:rPr lang="nb-NO" dirty="0">
+                <a:hlinkClick r:id="rId3"/>
+              </a:rPr>
+              <a:t>https://vuex.vuejs.org/</a:t>
+            </a:r>
+            <a:endParaRPr lang="nb-NO" dirty="0"/>
+          </a:p>
+        </p:txBody>
+      </p:sp>
+      <p:sp>
+        <p:nvSpPr>
+          <p:cNvPr id="4" name="Slide Number Placeholder 3"/>
+          <p:cNvSpPr>
+            <a:spLocks noGrp="1"/>
+          </p:cNvSpPr>
+          <p:nvPr>
+            <p:ph type="sldNum" sz="quarter" idx="5"/>
+          </p:nvPr>
+        </p:nvSpPr>
+        <p:spPr/>
+        <p:txBody>
+          <a:bodyPr/>
+          <a:lstStyle/>
+          <a:p>
+            <a:fld id="{EFAC016E-5E5F-3248-8F94-DBEB972C2B51}" type="slidenum">
+              <a:rPr lang="nb-NO" smtClean="0"/>
+              <a:t>9</a:t>
+            </a:fld>
+            <a:endParaRPr lang="nb-NO"/>
+          </a:p>
+        </p:txBody>
+      </p:sp>
+    </p:spTree>
+    <p:extLst>
+      <p:ext uri="{BB962C8B-B14F-4D97-AF65-F5344CB8AC3E}">
+        <p14:creationId xmlns:p14="http://schemas.microsoft.com/office/powerpoint/2010/main" val="637162742"/>
+      </p:ext>
+    </p:extLst>
+  </p:cSld>
+  <p:clrMapOvr>
+    <a:masterClrMapping/>
+  </p:clrMapOvr>
+</p:notes>
+</file>
+
+<file path=ppt/notesSlides/notesSlide5.xml><?xml version="1.0" encoding="utf-8"?>
+<p:notes xmlns:a="http://schemas.openxmlformats.org/drawingml/2006/main" xmlns:r="http://schemas.openxmlformats.org/officeDocument/2006/relationships" xmlns:p="http://schemas.openxmlformats.org/presentationml/2006/main">
+  <p:cSld>
+    <p:spTree>
+      <p:nvGrpSpPr>
+        <p:cNvPr id="1" name=""/>
+        <p:cNvGrpSpPr/>
+        <p:nvPr/>
+      </p:nvGrpSpPr>
+      <p:grpSpPr>
+        <a:xfrm>
+          <a:off x="0" y="0"/>
+          <a:ext cx="0" cy="0"/>
+          <a:chOff x="0" y="0"/>
+          <a:chExt cx="0" cy="0"/>
+        </a:xfrm>
+      </p:grpSpPr>
+      <p:sp>
+        <p:nvSpPr>
+          <p:cNvPr id="2" name="Slide Image Placeholder 1"/>
+          <p:cNvSpPr>
+            <a:spLocks noGrp="1" noRot="1" noChangeAspect="1"/>
+          </p:cNvSpPr>
+          <p:nvPr>
+            <p:ph type="sldImg"/>
+          </p:nvPr>
+        </p:nvSpPr>
+        <p:spPr/>
+      </p:sp>
+      <p:sp>
+        <p:nvSpPr>
+          <p:cNvPr id="3" name="Notes Placeholder 2"/>
+          <p:cNvSpPr>
+            <a:spLocks noGrp="1"/>
+          </p:cNvSpPr>
+          <p:nvPr>
+            <p:ph type="body" idx="1"/>
+          </p:nvPr>
+        </p:nvSpPr>
+        <p:spPr/>
+        <p:txBody>
+          <a:bodyPr/>
+          <a:lstStyle/>
+          <a:p>
+            <a:pPr marL="171450" indent="-171450">
+              <a:buFontTx/>
+              <a:buChar char="-"/>
+            </a:pPr>
+            <a:r>
+              <a:rPr lang="nb-NO" dirty="0"/>
               <a:t>Tilsvarer </a:t>
             </a:r>
             <a:r>
@@ -1947,6 +1779,16 @@
             <a:r>
               <a:rPr lang="nb-NO" dirty="0"/>
               <a:t> API</a:t>
+            </a:r>
+          </a:p>
+          <a:p>
+            <a:pPr marL="171450" indent="-171450">
+              <a:buFontTx/>
+              <a:buChar char="-"/>
+            </a:pPr>
+            <a:r>
+              <a:rPr lang="nb-NO" dirty="0"/>
+              <a:t>Go = antall steg fremover eller bakover i historien</a:t>
             </a:r>
           </a:p>
           <a:p>
@@ -5055,9 +4897,14 @@
           <a:lstStyle/>
           <a:p>
             <a:r>
+              <a:rPr lang="en-US" dirty="0"/>
+              <a:t>Oslo</a:t>
+            </a:r>
+            <a:r>
               <a:rPr lang="en-US"/>
-              <a:t>Oslo, 04.06.2018</a:t>
-            </a:r>
+              <a:t>, 04.06.2019</a:t>
+            </a:r>
+            <a:endParaRPr lang="en-US" dirty="0"/>
           </a:p>
         </p:txBody>
       </p:sp>
@@ -6675,7 +6522,7 @@
           <p:nvPr/>
         </p:nvPicPr>
         <p:blipFill rotWithShape="1">
-          <a:blip r:embed="rId2"/>
+          <a:blip r:embed="rId3"/>
           <a:srcRect l="1527" t="6960" r="4341" b="10952"/>
           <a:stretch/>
         </p:blipFill>
@@ -8119,16 +7966,16 @@
 <file path=customXml/itemProps3.xml><?xml version="1.0" encoding="utf-8"?>
 <ds:datastoreItem xmlns:ds="http://schemas.openxmlformats.org/officeDocument/2006/customXml" ds:itemID="{09A24B84-AF68-4B06-89ED-A483BC44F19D}">
   <ds:schemaRefs>
+    <ds:schemaRef ds:uri="http://schemas.microsoft.com/sharepoint/v3"/>
+    <ds:schemaRef ds:uri="http://purl.org/dc/terms/"/>
+    <ds:schemaRef ds:uri="http://purl.org/dc/dcmitype/"/>
     <ds:schemaRef ds:uri="3062a005-2a53-49b8-87d1-0d9762f3d40a"/>
-    <ds:schemaRef ds:uri="9c035199-34fe-41f5-aa4a-b81609954cdd"/>
-    <ds:schemaRef ds:uri="http://purl.org/dc/dcmitype/"/>
+    <ds:schemaRef ds:uri="http://schemas.microsoft.com/office/2006/documentManagement/types"/>
     <ds:schemaRef ds:uri="http://purl.org/dc/elements/1.1/"/>
-    <ds:schemaRef ds:uri="http://purl.org/dc/terms/"/>
-    <ds:schemaRef ds:uri="http://schemas.microsoft.com/office/2006/documentManagement/types"/>
     <ds:schemaRef ds:uri="http://schemas.microsoft.com/office/2006/metadata/properties"/>
     <ds:schemaRef ds:uri="http://schemas.microsoft.com/office/infopath/2007/PartnerControls"/>
-    <ds:schemaRef ds:uri="http://schemas.microsoft.com/sharepoint/v3"/>
     <ds:schemaRef ds:uri="http://schemas.openxmlformats.org/package/2006/metadata/core-properties"/>
+    <ds:schemaRef ds:uri="9c035199-34fe-41f5-aa4a-b81609954cdd"/>
     <ds:schemaRef ds:uri="http://www.w3.org/XML/1998/namespace"/>
   </ds:schemaRefs>
 </ds:datastoreItem>

</xml_diff>

<commit_message>
Endrer for høstens utgave
</commit_message>
<xml_diff>
--- a/course_material/TCCS-Frontend.pptx
+++ b/course_material/TCCS-Frontend.pptx
@@ -156,6 +156,7 @@
   <p1510:revLst>
     <p1510:client id="{1466A448-422F-E805-FC55-6E4E7C33FA5E}" v="104" dt="2020-06-02T13:36:50.050"/>
     <p1510:client id="{36DE2F71-07E5-E0CB-C059-E66A5A046D79}" v="617" dt="2020-06-02T18:34:38.777"/>
+    <p1510:client id="{3C409AE2-A24A-3FFD-4DF9-B55782C144A6}" v="601" dt="2020-08-24T17:06:45.123"/>
     <p1510:client id="{43FD2034-788A-15D2-A537-CAB46E3F808E}" v="483" dt="2020-06-02T18:51:46.557"/>
     <p1510:client id="{9A6406E3-8CE0-4052-A64F-061140C954AE}" v="1422" dt="2020-06-03T03:13:16.076"/>
     <p1510:client id="{A17A8181-0169-E88D-DF50-3886C1AE032F}" v="927" dt="2020-06-02T19:57:14.969"/>
@@ -258,7 +259,7 @@
           <a:p>
             <a:fld id="{834E6BEA-3EAF-184F-971B-CE59E0ED1E73}" type="datetimeFigureOut">
               <a:rPr lang="da-DK" smtClean="0"/>
-              <a:t>02-06-2020</a:t>
+              <a:t>25-08-2020</a:t>
             </a:fld>
             <a:endParaRPr lang="da-DK"/>
           </a:p>
@@ -435,7 +436,7 @@
           <a:p>
             <a:fld id="{72AACAED-7BFE-974C-9513-70D0F3B3319B}" type="datetimeFigureOut">
               <a:rPr lang="da-DK" smtClean="0"/>
-              <a:t>02-06-2020</a:t>
+              <a:t>25-08-2020</a:t>
             </a:fld>
             <a:endParaRPr lang="da-DK"/>
           </a:p>
@@ -11993,16 +11994,16 @@
           <a:lstStyle/>
           <a:p>
             <a:r>
-              <a:rPr lang="da-DK">
+              <a:rPr lang="da-DK" dirty="0">
                 <a:solidFill>
                   <a:srgbClr val="FFFFFF"/>
                 </a:solidFill>
                 <a:latin typeface="Arial"/>
               </a:rPr>
-              <a:t>Oslo, 03.06.2020</a:t>
-            </a:r>
-            <a:r>
-              <a:rPr lang="da-DK">
+              <a:t>Oslo, 25.08.2020</a:t>
+            </a:r>
+            <a:r>
+              <a:rPr lang="da-DK" dirty="0">
                 <a:latin typeface="Arial"/>
                 <a:ea typeface="Arial"/>
                 <a:cs typeface="Arial"/>
@@ -14603,63 +14604,91 @@
           </a:xfrm>
         </p:spPr>
         <p:txBody>
-          <a:bodyPr/>
+          <a:bodyPr>
+            <a:normAutofit/>
+          </a:bodyPr>
           <a:lstStyle/>
           <a:p>
             <a:r>
               <a:rPr lang="en-US" dirty="0">
-                <a:cs typeface="Calibri"/>
+                <a:ea typeface="+mn-lt"/>
+                <a:cs typeface="+mn-lt"/>
               </a:rPr>
-              <a:t>08.00 - 09.00: Welcome and presentation</a:t>
-            </a:r>
+              <a:t>08.00 - 08.30: Welcome and presentation</a:t>
+            </a:r>
+            <a:endParaRPr lang="en-US" dirty="0"/>
           </a:p>
           <a:p>
             <a:r>
               <a:rPr lang="en-US" dirty="0">
-                <a:cs typeface="Calibri"/>
+                <a:ea typeface="+mn-lt"/>
+                <a:cs typeface="+mn-lt"/>
               </a:rPr>
-              <a:t>09.00 - 11.00: Assignment 1, 2 &amp; 3</a:t>
-            </a:r>
+              <a:t>08.30 - 11.00: Assignment 1, 2 &amp; 3</a:t>
+            </a:r>
+            <a:endParaRPr lang="da-DK" dirty="0"/>
           </a:p>
           <a:p>
             <a:r>
               <a:rPr lang="en-US" dirty="0">
-                <a:cs typeface="Calibri"/>
+                <a:ea typeface="+mn-lt"/>
+                <a:cs typeface="+mn-lt"/>
               </a:rPr>
-              <a:t>11.00 - 11.30: Lunch break</a:t>
-            </a:r>
+              <a:t>11.00 - 12.00: Assignment 4</a:t>
+            </a:r>
+            <a:endParaRPr lang="en-US" dirty="0">
+              <a:cs typeface="Calibri"/>
+            </a:endParaRPr>
           </a:p>
           <a:p>
             <a:r>
               <a:rPr lang="en-US" dirty="0">
-                <a:cs typeface="Calibri"/>
+                <a:ea typeface="+mn-lt"/>
+                <a:cs typeface="+mn-lt"/>
               </a:rPr>
-              <a:t>11.30 - 12.30: Assignment 4</a:t>
+              <a:t>12.00 - 13.00: Lunch break</a:t>
             </a:r>
           </a:p>
           <a:p>
             <a:r>
               <a:rPr lang="en-US" dirty="0">
-                <a:cs typeface="Calibri"/>
+                <a:ea typeface="+mn-lt"/>
+                <a:cs typeface="+mn-lt"/>
               </a:rPr>
-              <a:t>12.30 - 13.30: Assignment 5</a:t>
+              <a:t>13.00 - 14.00: Assignment 5</a:t>
+            </a:r>
+            <a:endParaRPr lang="da-DK">
+              <a:cs typeface="Calibri" panose="020F0502020204030204"/>
+            </a:endParaRPr>
+          </a:p>
+          <a:p>
+            <a:r>
+              <a:rPr lang="da-DK" dirty="0">
+                <a:ea typeface="+mn-lt"/>
+                <a:cs typeface="+mn-lt"/>
+              </a:rPr>
+              <a:t>14.00 - 14.15: Snack break</a:t>
             </a:r>
           </a:p>
           <a:p>
             <a:r>
               <a:rPr lang="en-US" dirty="0">
-                <a:cs typeface="Calibri"/>
+                <a:ea typeface="+mn-lt"/>
+                <a:cs typeface="+mn-lt"/>
               </a:rPr>
-              <a:t>13.30 - 15.00: Assignment 6</a:t>
-            </a:r>
+              <a:t>14.15 - 15.30: Assignment 6</a:t>
+            </a:r>
+            <a:endParaRPr lang="da-DK" dirty="0"/>
           </a:p>
           <a:p>
             <a:r>
               <a:rPr lang="en-US" dirty="0">
-                <a:cs typeface="Calibri"/>
+                <a:ea typeface="+mn-lt"/>
+                <a:cs typeface="+mn-lt"/>
               </a:rPr>
-              <a:t>15.00 - 15.30: Assignment 7</a:t>
-            </a:r>
+              <a:t>15.30 - 16.00: Assignment 7</a:t>
+            </a:r>
+            <a:endParaRPr lang="da-DK" dirty="0"/>
           </a:p>
           <a:p>
             <a:r>
@@ -14668,6 +14697,17 @@
                 <a:cs typeface="+mn-lt"/>
               </a:rPr>
               <a:t>Rest of the day: Assignment 8 &amp; 9. If you run out of time, prioritize assignment 9.</a:t>
+            </a:r>
+            <a:endParaRPr lang="en-US" dirty="0">
+              <a:cs typeface="Calibri"/>
+            </a:endParaRPr>
+          </a:p>
+          <a:p>
+            <a:r>
+              <a:rPr lang="en-US" dirty="0">
+                <a:cs typeface="Calibri"/>
+              </a:rPr>
+              <a:t>16.30-ish: Wrapping up</a:t>
             </a:r>
           </a:p>
           <a:p>
@@ -14771,116 +14811,215 @@
         </p:spPr>
         <p:txBody>
           <a:bodyPr anchor="t">
-            <a:normAutofit lnSpcReduction="10000"/>
+            <a:normAutofit fontScale="92500" lnSpcReduction="10000"/>
           </a:bodyPr>
           <a:lstStyle/>
           <a:p>
             <a:r>
-              <a:rPr lang="da-DK" dirty="0"/>
+              <a:rPr lang="da-DK" dirty="0" err="1">
+                <a:ea typeface="+mn-lt"/>
+                <a:cs typeface="+mn-lt"/>
+              </a:rPr>
               <a:t>Welcome</a:t>
             </a:r>
+            <a:endParaRPr lang="da-DK">
+              <a:ea typeface="+mn-lt"/>
+              <a:cs typeface="+mn-lt"/>
+            </a:endParaRPr>
+          </a:p>
+          <a:p>
+            <a:r>
+              <a:rPr lang="da-DK" dirty="0" err="1">
+                <a:ea typeface="+mn-lt"/>
+                <a:cs typeface="+mn-lt"/>
+              </a:rPr>
+              <a:t>Frontend</a:t>
+            </a:r>
+            <a:r>
+              <a:rPr lang="da-DK" dirty="0">
+                <a:ea typeface="+mn-lt"/>
+                <a:cs typeface="+mn-lt"/>
+              </a:rPr>
+              <a:t> </a:t>
+            </a:r>
+            <a:r>
+              <a:rPr lang="da-DK" dirty="0" err="1">
+                <a:ea typeface="+mn-lt"/>
+                <a:cs typeface="+mn-lt"/>
+              </a:rPr>
+              <a:t>stack</a:t>
+            </a:r>
+            <a:endParaRPr lang="da-DK">
+              <a:ea typeface="+mn-lt"/>
+              <a:cs typeface="+mn-lt"/>
+            </a:endParaRPr>
+          </a:p>
+          <a:p>
+            <a:r>
+              <a:rPr lang="da-DK" dirty="0" err="1">
+                <a:ea typeface="+mn-lt"/>
+                <a:cs typeface="+mn-lt"/>
+              </a:rPr>
+              <a:t>Concepts</a:t>
+            </a:r>
+            <a:endParaRPr lang="da-DK">
+              <a:ea typeface="+mn-lt"/>
+              <a:cs typeface="+mn-lt"/>
+            </a:endParaRPr>
+          </a:p>
+          <a:p>
+            <a:pPr lvl="1" indent="-134620"/>
+            <a:r>
+              <a:rPr lang="da-DK" dirty="0" err="1">
+                <a:ea typeface="+mn-lt"/>
+                <a:cs typeface="+mn-lt"/>
+              </a:rPr>
+              <a:t>Javascript</a:t>
+            </a:r>
+            <a:endParaRPr lang="da-DK">
+              <a:ea typeface="+mn-lt"/>
+              <a:cs typeface="+mn-lt"/>
+            </a:endParaRPr>
+          </a:p>
+          <a:p>
+            <a:pPr lvl="1" indent="-134620"/>
+            <a:r>
+              <a:rPr lang="da-DK" dirty="0">
+                <a:ea typeface="+mn-lt"/>
+                <a:cs typeface="+mn-lt"/>
+              </a:rPr>
+              <a:t>Vue</a:t>
+            </a:r>
+          </a:p>
+          <a:p>
+            <a:pPr lvl="1" indent="-134620"/>
+            <a:r>
+              <a:rPr lang="da-DK" dirty="0" err="1">
+                <a:ea typeface="+mn-lt"/>
+                <a:cs typeface="+mn-lt"/>
+              </a:rPr>
+              <a:t>SPAs</a:t>
+            </a:r>
+            <a:r>
+              <a:rPr lang="da-DK" dirty="0">
+                <a:ea typeface="+mn-lt"/>
+                <a:cs typeface="+mn-lt"/>
+              </a:rPr>
+              <a:t> and routing</a:t>
+            </a:r>
+          </a:p>
+          <a:p>
+            <a:pPr lvl="1" indent="-134620"/>
+            <a:r>
+              <a:rPr lang="da-DK" dirty="0" err="1">
+                <a:ea typeface="+mn-lt"/>
+                <a:cs typeface="+mn-lt"/>
+              </a:rPr>
+              <a:t>Testing</a:t>
+            </a:r>
+            <a:endParaRPr lang="en-US" dirty="0" err="1">
+              <a:ea typeface="+mn-lt"/>
+              <a:cs typeface="+mn-lt"/>
+            </a:endParaRPr>
+          </a:p>
+          <a:p>
+            <a:pPr lvl="1" indent="-134620"/>
+            <a:r>
+              <a:rPr lang="da-DK" dirty="0" err="1">
+                <a:ea typeface="+mn-lt"/>
+                <a:cs typeface="+mn-lt"/>
+              </a:rPr>
+              <a:t>Talking</a:t>
+            </a:r>
+            <a:r>
+              <a:rPr lang="da-DK" dirty="0">
+                <a:ea typeface="+mn-lt"/>
+                <a:cs typeface="+mn-lt"/>
+              </a:rPr>
+              <a:t> to server</a:t>
+            </a:r>
+          </a:p>
+          <a:p>
+            <a:r>
+              <a:rPr lang="da-DK" dirty="0">
+                <a:ea typeface="+mn-lt"/>
+                <a:cs typeface="+mn-lt"/>
+              </a:rPr>
+              <a:t>Work with </a:t>
+            </a:r>
+            <a:r>
+              <a:rPr lang="da-DK" dirty="0" err="1">
+                <a:ea typeface="+mn-lt"/>
+                <a:cs typeface="+mn-lt"/>
+              </a:rPr>
+              <a:t>assignments</a:t>
+            </a:r>
+            <a:endParaRPr lang="da-DK">
+              <a:ea typeface="+mn-lt"/>
+              <a:cs typeface="+mn-lt"/>
+            </a:endParaRPr>
+          </a:p>
+          <a:p>
+            <a:r>
+              <a:rPr lang="da-DK" dirty="0">
+                <a:ea typeface="+mn-lt"/>
+                <a:cs typeface="+mn-lt"/>
+              </a:rPr>
+              <a:t>12.00 - 13.00 Lunch break</a:t>
+            </a:r>
+          </a:p>
+          <a:p>
+            <a:r>
+              <a:rPr lang="da-DK" dirty="0">
+                <a:ea typeface="+mn-lt"/>
+                <a:cs typeface="+mn-lt"/>
+              </a:rPr>
+              <a:t>Work with </a:t>
+            </a:r>
+            <a:r>
+              <a:rPr lang="da-DK" dirty="0" err="1">
+                <a:ea typeface="+mn-lt"/>
+                <a:cs typeface="+mn-lt"/>
+              </a:rPr>
+              <a:t>assignments</a:t>
+            </a:r>
+          </a:p>
+          <a:p>
+            <a:r>
+              <a:rPr lang="da-DK" dirty="0">
+                <a:ea typeface="+mn-lt"/>
+                <a:cs typeface="+mn-lt"/>
+              </a:rPr>
+              <a:t>14.00 - 14.15 Snack break</a:t>
+            </a:r>
+          </a:p>
+          <a:p>
+            <a:r>
+              <a:rPr lang="da-DK" dirty="0">
+                <a:ea typeface="+mn-lt"/>
+                <a:cs typeface="+mn-lt"/>
+              </a:rPr>
+              <a:t>16.30 - 17.00 </a:t>
+            </a:r>
+            <a:r>
+              <a:rPr lang="da-DK" dirty="0" err="1">
+                <a:ea typeface="+mn-lt"/>
+                <a:cs typeface="+mn-lt"/>
+              </a:rPr>
+              <a:t>Wrapping</a:t>
+            </a:r>
+            <a:r>
+              <a:rPr lang="da-DK" dirty="0">
+                <a:ea typeface="+mn-lt"/>
+                <a:cs typeface="+mn-lt"/>
+              </a:rPr>
+              <a:t> it up</a:t>
+            </a:r>
+          </a:p>
+          <a:p>
             <a:endParaRPr lang="da-DK" dirty="0">
               <a:cs typeface="Calibri"/>
             </a:endParaRPr>
-          </a:p>
-          <a:p>
-            <a:r>
-              <a:rPr lang="da-DK" dirty="0"/>
-              <a:t>Frontend stack</a:t>
-            </a:r>
-            <a:endParaRPr lang="da-DK" dirty="0">
-              <a:cs typeface="Calibri"/>
-            </a:endParaRPr>
-          </a:p>
-          <a:p>
-            <a:r>
-              <a:rPr lang="da-DK" dirty="0"/>
-              <a:t>Concepts</a:t>
-            </a:r>
-            <a:endParaRPr lang="da-DK" dirty="0">
-              <a:cs typeface="Calibri"/>
-            </a:endParaRPr>
-          </a:p>
-          <a:p>
-            <a:pPr lvl="1" indent="-134620"/>
-            <a:r>
-              <a:rPr lang="da-DK" dirty="0"/>
-              <a:t>Javascript</a:t>
-            </a:r>
-            <a:endParaRPr lang="da-DK" sz="1600" dirty="0"/>
-          </a:p>
-          <a:p>
-            <a:pPr lvl="1" indent="-134620"/>
-            <a:r>
-              <a:rPr lang="da-DK" dirty="0">
-                <a:cs typeface="Calibri"/>
-              </a:rPr>
-              <a:t>Vue</a:t>
-            </a:r>
-            <a:endParaRPr lang="da-DK" dirty="0"/>
-          </a:p>
-          <a:p>
-            <a:pPr lvl="1" indent="-134620"/>
-            <a:r>
-              <a:rPr lang="da-DK" dirty="0">
-                <a:cs typeface="Calibri"/>
-              </a:rPr>
-              <a:t>Testing</a:t>
-            </a:r>
-          </a:p>
-          <a:p>
-            <a:pPr lvl="1" indent="-134620"/>
-            <a:r>
-              <a:rPr lang="da-DK" dirty="0">
-                <a:cs typeface="Calibri"/>
-              </a:rPr>
-              <a:t>Talking to server</a:t>
-            </a:r>
-            <a:endParaRPr lang="da-DK" dirty="0"/>
-          </a:p>
-          <a:p>
-            <a:r>
-              <a:rPr lang="da-DK" dirty="0"/>
-              <a:t>Find your groups</a:t>
-            </a:r>
-            <a:endParaRPr lang="da-DK" dirty="0">
-              <a:cs typeface="Calibri"/>
-            </a:endParaRPr>
-          </a:p>
-          <a:p>
-            <a:r>
-              <a:rPr lang="da-DK" dirty="0"/>
-              <a:t>Work with assignments</a:t>
-            </a:r>
-            <a:endParaRPr lang="da-DK" dirty="0">
-              <a:cs typeface="Calibri"/>
-            </a:endParaRPr>
-          </a:p>
-          <a:p>
-            <a:r>
-              <a:rPr lang="da-DK" dirty="0"/>
-              <a:t>11.00 - 11.30 Lunch break</a:t>
-            </a:r>
-            <a:endParaRPr lang="da-DK" dirty="0">
-              <a:cs typeface="Calibri"/>
-            </a:endParaRPr>
-          </a:p>
-          <a:p>
-            <a:r>
-              <a:rPr lang="da-DK" dirty="0"/>
-              <a:t>Work with assignments</a:t>
-            </a:r>
-            <a:endParaRPr lang="da-DK" dirty="0">
-              <a:cs typeface="Calibri"/>
-            </a:endParaRPr>
-          </a:p>
-          <a:p>
-            <a:r>
-              <a:rPr lang="da-DK" dirty="0">
-                <a:cs typeface="Calibri"/>
-              </a:rPr>
-              <a:t>15.50 - 16.00 Wrapping it up (join the video meeting again)</a:t>
-            </a:r>
           </a:p>
           <a:p>
             <a:pPr marL="0" indent="0">
@@ -14921,9 +15060,10 @@
           <a:lstStyle/>
           <a:p>
             <a:r>
-              <a:rPr lang="en-US" dirty="0"/>
+              <a:rPr lang="en-US"/>
               <a:t>Agenda</a:t>
             </a:r>
+            <a:endParaRPr lang="en-US" dirty="0"/>
           </a:p>
         </p:txBody>
       </p:sp>
@@ -14996,7 +15136,7 @@
 </file>
 
 <file path=ppt/slides/slide3.xml><?xml version="1.0" encoding="utf-8"?>
-<p:sld xmlns:a="http://schemas.openxmlformats.org/drawingml/2006/main" xmlns:r="http://schemas.openxmlformats.org/officeDocument/2006/relationships" xmlns:p="http://schemas.openxmlformats.org/presentationml/2006/main">
+<p:sld xmlns:a="http://schemas.openxmlformats.org/drawingml/2006/main" xmlns:r="http://schemas.openxmlformats.org/officeDocument/2006/relationships" xmlns:p="http://schemas.openxmlformats.org/presentationml/2006/main" show="0">
   <p:cSld>
     <p:spTree>
       <p:nvGrpSpPr>
@@ -18139,16 +18279,8 @@
 <file path=customXml/itemProps3.xml><?xml version="1.0" encoding="utf-8"?>
 <ds:datastoreItem xmlns:ds="http://schemas.openxmlformats.org/officeDocument/2006/customXml" ds:itemID="{03D2B48E-5341-4D77-92BA-70949B976E64}">
   <ds:schemaRefs>
-    <ds:schemaRef ds:uri="44874a9c-fda6-40dd-97be-62d9b863c768"/>
-    <ds:schemaRef ds:uri="http://schemas.microsoft.com/office/2006/documentManagement/types"/>
-    <ds:schemaRef ds:uri="http://www.w3.org/XML/1998/namespace"/>
-    <ds:schemaRef ds:uri="http://schemas.openxmlformats.org/package/2006/metadata/core-properties"/>
-    <ds:schemaRef ds:uri="http://purl.org/dc/elements/1.1/"/>
     <ds:schemaRef ds:uri="http://schemas.microsoft.com/office/2006/metadata/properties"/>
     <ds:schemaRef ds:uri="http://schemas.microsoft.com/office/infopath/2007/PartnerControls"/>
-    <ds:schemaRef ds:uri="b21efdfb-ea61-493c-999a-e9a9c2ee2b5b"/>
-    <ds:schemaRef ds:uri="http://purl.org/dc/dcmitype/"/>
-    <ds:schemaRef ds:uri="http://purl.org/dc/terms/"/>
   </ds:schemaRefs>
 </ds:datastoreItem>
 </file>
</xml_diff>